<commit_message>
Minor change to Node.js PPT
</commit_message>
<xml_diff>
--- a/Hands-on Intro to Node 01-12-2015/Hands-on Intro to Node.pptx
+++ b/Hands-on Intro to Node 01-12-2015/Hands-on Intro to Node.pptx
@@ -357,7 +357,7 @@
           <a:p>
             <a:fld id="{2DF66AD8-BC4A-4004-9882-414398D930CA}" type="datetimeFigureOut">
               <a:rPr lang="en-US" smtClean="0"/>
-              <a:t>1/12/15</a:t>
+              <a:t>1/13/15</a:t>
             </a:fld>
             <a:endParaRPr lang="en-US"/>
           </a:p>
@@ -502,7 +502,7 @@
           <a:p>
             <a:fld id="{2DF66AD8-BC4A-4004-9882-414398D930CA}" type="datetimeFigureOut">
               <a:rPr lang="en-US" smtClean="0"/>
-              <a:t>1/12/15</a:t>
+              <a:t>1/13/15</a:t>
             </a:fld>
             <a:endParaRPr lang="en-US"/>
           </a:p>
@@ -959,7 +959,7 @@
           <a:p>
             <a:fld id="{2DF66AD8-BC4A-4004-9882-414398D930CA}" type="datetimeFigureOut">
               <a:rPr lang="en-US" smtClean="0"/>
-              <a:t>1/12/15</a:t>
+              <a:t>1/13/15</a:t>
             </a:fld>
             <a:endParaRPr lang="en-US"/>
           </a:p>
@@ -1327,7 +1327,7 @@
           <a:p>
             <a:fld id="{2DF66AD8-BC4A-4004-9882-414398D930CA}" type="datetimeFigureOut">
               <a:rPr lang="en-US" smtClean="0"/>
-              <a:t>1/12/15</a:t>
+              <a:t>1/13/15</a:t>
             </a:fld>
             <a:endParaRPr lang="en-US"/>
           </a:p>
@@ -1417,7 +1417,7 @@
           <a:p>
             <a:fld id="{2DF66AD8-BC4A-4004-9882-414398D930CA}" type="datetimeFigureOut">
               <a:rPr lang="en-US" smtClean="0"/>
-              <a:t>1/12/15</a:t>
+              <a:t>1/13/15</a:t>
             </a:fld>
             <a:endParaRPr lang="en-US"/>
           </a:p>
@@ -1695,7 +1695,7 @@
           <a:p>
             <a:fld id="{2DF66AD8-BC4A-4004-9882-414398D930CA}" type="datetimeFigureOut">
               <a:rPr lang="en-US" smtClean="0"/>
-              <a:t>1/12/15</a:t>
+              <a:t>1/13/15</a:t>
             </a:fld>
             <a:endParaRPr lang="en-US"/>
           </a:p>
@@ -1888,7 +1888,7 @@
           <a:p>
             <a:fld id="{2DF66AD8-BC4A-4004-9882-414398D930CA}" type="datetimeFigureOut">
               <a:rPr lang="en-US" smtClean="0"/>
-              <a:t>1/12/15</a:t>
+              <a:t>1/13/15</a:t>
             </a:fld>
             <a:endParaRPr lang="en-US"/>
           </a:p>
@@ -2630,7 +2630,7 @@
           <a:p>
             <a:fld id="{2DF66AD8-BC4A-4004-9882-414398D930CA}" type="datetimeFigureOut">
               <a:rPr lang="en-US" smtClean="0"/>
-              <a:t>1/12/15</a:t>
+              <a:t>1/13/15</a:t>
             </a:fld>
             <a:endParaRPr lang="en-US"/>
           </a:p>
@@ -2968,7 +2968,7 @@
           <a:p>
             <a:fld id="{2DF66AD8-BC4A-4004-9882-414398D930CA}" type="datetimeFigureOut">
               <a:rPr lang="en-US" smtClean="0"/>
-              <a:t>1/12/15</a:t>
+              <a:t>1/13/15</a:t>
             </a:fld>
             <a:endParaRPr lang="en-US"/>
           </a:p>
@@ -3565,7 +3565,7 @@
           <a:p>
             <a:fld id="{2DF66AD8-BC4A-4004-9882-414398D930CA}" type="datetimeFigureOut">
               <a:rPr lang="en-US" smtClean="0"/>
-              <a:t>1/12/15</a:t>
+              <a:t>1/13/15</a:t>
             </a:fld>
             <a:endParaRPr lang="en-US"/>
           </a:p>
@@ -3748,7 +3748,7 @@
           <a:p>
             <a:fld id="{2DF66AD8-BC4A-4004-9882-414398D930CA}" type="datetimeFigureOut">
               <a:rPr lang="en-US" smtClean="0"/>
-              <a:t>1/12/15</a:t>
+              <a:t>1/13/15</a:t>
             </a:fld>
             <a:endParaRPr lang="en-US"/>
           </a:p>
@@ -3917,7 +3917,7 @@
           <a:p>
             <a:fld id="{2DF66AD8-BC4A-4004-9882-414398D930CA}" type="datetimeFigureOut">
               <a:rPr lang="en-US" smtClean="0"/>
-              <a:t>1/12/15</a:t>
+              <a:t>1/13/15</a:t>
             </a:fld>
             <a:endParaRPr lang="en-US"/>
           </a:p>
@@ -4110,7 +4110,7 @@
           <a:p>
             <a:fld id="{2DF66AD8-BC4A-4004-9882-414398D930CA}" type="datetimeFigureOut">
               <a:rPr lang="en-US" smtClean="0"/>
-              <a:t>1/12/15</a:t>
+              <a:t>1/13/15</a:t>
             </a:fld>
             <a:endParaRPr lang="en-US"/>
           </a:p>
@@ -4529,7 +4529,7 @@
           <a:p>
             <a:fld id="{2DF66AD8-BC4A-4004-9882-414398D930CA}" type="datetimeFigureOut">
               <a:rPr lang="en-US" smtClean="0"/>
-              <a:t>1/12/15</a:t>
+              <a:t>1/13/15</a:t>
             </a:fld>
             <a:endParaRPr lang="en-US"/>
           </a:p>
@@ -4827,7 +4827,7 @@
           <a:p>
             <a:fld id="{2DF66AD8-BC4A-4004-9882-414398D930CA}" type="datetimeFigureOut">
               <a:rPr lang="en-US" smtClean="0"/>
-              <a:t>1/12/15</a:t>
+              <a:t>1/13/15</a:t>
             </a:fld>
             <a:endParaRPr lang="en-US"/>
           </a:p>
@@ -5228,7 +5228,7 @@
           <a:p>
             <a:fld id="{2DF66AD8-BC4A-4004-9882-414398D930CA}" type="datetimeFigureOut">
               <a:rPr lang="en-US" smtClean="0"/>
-              <a:t>1/12/15</a:t>
+              <a:t>1/13/15</a:t>
             </a:fld>
             <a:endParaRPr lang="en-US"/>
           </a:p>
@@ -5618,7 +5618,7 @@
           <a:p>
             <a:fld id="{2DF66AD8-BC4A-4004-9882-414398D930CA}" type="datetimeFigureOut">
               <a:rPr lang="en-US" smtClean="0"/>
-              <a:t>1/12/15</a:t>
+              <a:t>1/13/15</a:t>
             </a:fld>
             <a:endParaRPr lang="en-US"/>
           </a:p>
@@ -5901,7 +5901,7 @@
           <a:p>
             <a:fld id="{2DF66AD8-BC4A-4004-9882-414398D930CA}" type="datetimeFigureOut">
               <a:rPr lang="en-US" smtClean="0"/>
-              <a:t>1/12/15</a:t>
+              <a:t>1/13/15</a:t>
             </a:fld>
             <a:endParaRPr lang="en-US"/>
           </a:p>
@@ -6340,7 +6340,7 @@
           <a:p>
             <a:fld id="{2DF66AD8-BC4A-4004-9882-414398D930CA}" type="datetimeFigureOut">
               <a:rPr lang="en-US" smtClean="0"/>
-              <a:t>1/12/15</a:t>
+              <a:t>1/13/15</a:t>
             </a:fld>
             <a:endParaRPr lang="en-US"/>
           </a:p>
@@ -6634,7 +6634,7 @@
           <a:p>
             <a:fld id="{2DF66AD8-BC4A-4004-9882-414398D930CA}" type="datetimeFigureOut">
               <a:rPr lang="en-US" smtClean="0"/>
-              <a:t>1/12/15</a:t>
+              <a:t>1/13/15</a:t>
             </a:fld>
             <a:endParaRPr lang="en-US"/>
           </a:p>
@@ -6926,7 +6926,7 @@
           <a:p>
             <a:fld id="{2DF66AD8-BC4A-4004-9882-414398D930CA}" type="datetimeFigureOut">
               <a:rPr lang="en-US" smtClean="0"/>
-              <a:t>1/12/15</a:t>
+              <a:t>1/13/15</a:t>
             </a:fld>
             <a:endParaRPr lang="en-US"/>
           </a:p>
@@ -7411,73 +7411,6 @@
           </a:p>
         </p:txBody>
       </p:sp>
-      <p:sp>
-        <p:nvSpPr>
-          <p:cNvPr id="4" name="TextBox 3"/>
-          <p:cNvSpPr txBox="1"/>
-          <p:nvPr/>
-        </p:nvSpPr>
-        <p:spPr>
-          <a:xfrm>
-            <a:off x="4600223" y="677333"/>
-            <a:ext cx="4086578" cy="1384995"/>
-          </a:xfrm>
-          <a:prstGeom prst="rect">
-            <a:avLst/>
-          </a:prstGeom>
-          <a:noFill/>
-        </p:spPr>
-        <p:txBody>
-          <a:bodyPr wrap="square" rtlCol="0">
-            <a:spAutoFit/>
-          </a:bodyPr>
-          <a:lstStyle/>
-          <a:p>
-            <a:pPr algn="r"/>
-            <a:r>
-              <a:rPr lang="en-US" sz="2800" dirty="0" err="1" smtClean="0"/>
-              <a:t>Wi-fi</a:t>
-            </a:r>
-            <a:r>
-              <a:rPr lang="en-US" sz="2800" dirty="0" smtClean="0"/>
-              <a:t>: </a:t>
-            </a:r>
-            <a:r>
-              <a:rPr lang="en-US" sz="2800" dirty="0" err="1" smtClean="0"/>
-              <a:t>VHTGuest</a:t>
-            </a:r>
-            <a:endParaRPr lang="en-US" sz="2800" dirty="0" smtClean="0"/>
-          </a:p>
-          <a:p>
-            <a:pPr algn="r"/>
-            <a:r>
-              <a:rPr lang="en-US" sz="2800" dirty="0" smtClean="0"/>
-              <a:t>Login: </a:t>
-            </a:r>
-            <a:r>
-              <a:rPr lang="en-US" sz="2800" dirty="0" err="1" smtClean="0"/>
-              <a:t>devguest</a:t>
-            </a:r>
-            <a:endParaRPr lang="en-US" sz="2800" dirty="0" smtClean="0"/>
-          </a:p>
-          <a:p>
-            <a:pPr algn="r"/>
-            <a:r>
-              <a:rPr lang="en-US" sz="2800" dirty="0" smtClean="0"/>
-              <a:t>Password: </a:t>
-            </a:r>
-            <a:r>
-              <a:rPr lang="en-US" sz="2800" dirty="0" err="1" smtClean="0"/>
-              <a:t>VHTguest</a:t>
-            </a:r>
-            <a:r>
-              <a:rPr lang="en-US" sz="2800" dirty="0" smtClean="0"/>
-              <a:t>!</a:t>
-            </a:r>
-            <a:endParaRPr lang="en-US" sz="2800" dirty="0"/>
-          </a:p>
-        </p:txBody>
-      </p:sp>
     </p:spTree>
     <p:extLst>
       <p:ext uri="{BB962C8B-B14F-4D97-AF65-F5344CB8AC3E}">

</xml_diff>